<commit_message>
finished IM and powerpoint presentation
</commit_message>
<xml_diff>
--- a/IM.pptx
+++ b/IM.pptx
@@ -19,7 +19,6 @@
     <p:sldId id="267" r:id="rId13"/>
     <p:sldId id="268" r:id="rId14"/>
     <p:sldId id="269" r:id="rId15"/>
-    <p:sldId id="270" r:id="rId16"/>
   </p:sldIdLst>
   <p:sldSz cx="9144000" cy="5143500" type="screen16x9"/>
   <p:notesSz cx="6858000" cy="9144000"/>
@@ -3129,7 +3128,7 @@
             </a:pPr>
             <a:r>
               <a:rPr/>
-              <a:t>IM</a:t>
+              <a:t>Proving Pythagorean Theorem</a:t>
             </a:r>
           </a:p>
         </p:txBody>
@@ -3197,58 +3196,6 @@
 </file>
 
 <file path=ppt/slides/slide10.xml><?xml version="1.0" encoding="utf-8"?>
-<p:sld xmlns:a="http://schemas.openxmlformats.org/drawingml/2006/main" xmlns:r="http://schemas.openxmlformats.org/officeDocument/2006/relationships" xmlns:p="http://schemas.openxmlformats.org/presentationml/2006/main">
-  <p:cSld>
-    <p:spTree>
-      <p:nvGrpSpPr>
-        <p:cNvPr id="1" name=""/>
-        <p:cNvGrpSpPr/>
-        <p:nvPr/>
-      </p:nvGrpSpPr>
-      <p:grpSpPr>
-        <a:xfrm>
-          <a:off x="0" y="0"/>
-          <a:ext cx="0" cy="0"/>
-          <a:chOff x="0" y="0"/>
-          <a:chExt cx="0" cy="0"/>
-        </a:xfrm>
-      </p:grpSpPr>
-      <p:pic>
-        <p:nvPicPr>
-          <p:cNvPr descr="Screenshot%202024-05-26%20221044.png" id="0" name="Picture 1"/>
-          <p:cNvPicPr>
-            <a:picLocks noGrp="1" noChangeAspect="1"/>
-          </p:cNvPicPr>
-          <p:nvPr/>
-        </p:nvPicPr>
-        <p:blipFill>
-          <a:blip r:embed="rId2"/>
-          <a:stretch>
-            <a:fillRect/>
-          </a:stretch>
-        </p:blipFill>
-        <p:spPr bwMode="auto">
-          <a:xfrm>
-            <a:off x="457200" y="1447800"/>
-            <a:ext cx="8229600" cy="2895600"/>
-          </a:xfrm>
-          <a:prstGeom prst="rect">
-            <a:avLst/>
-          </a:prstGeom>
-          <a:noFill/>
-          <a:ln w="9525">
-            <a:noFill/>
-            <a:headEnd/>
-            <a:tailEnd/>
-          </a:ln>
-        </p:spPr>
-      </p:pic>
-    </p:spTree>
-  </p:cSld>
-</p:sld>
-</file>
-
-<file path=ppt/slides/slide11.xml><?xml version="1.0" encoding="utf-8"?>
 <p:sld xmlns:a="http://schemas.openxmlformats.org/drawingml/2006/main" xmlns:r="http://schemas.openxmlformats.org/officeDocument/2006/relationships" xmlns:p="http://schemas.openxmlformats.org/presentationml/2006/main">
   <p:cSld>
     <p:spTree>
@@ -3325,7 +3272,7 @@
 </p:sld>
 </file>
 
-<file path=ppt/slides/slide12.xml><?xml version="1.0" encoding="utf-8"?>
+<file path=ppt/slides/slide11.xml><?xml version="1.0" encoding="utf-8"?>
 <p:sld xmlns:a="http://schemas.openxmlformats.org/drawingml/2006/main" xmlns:r="http://schemas.openxmlformats.org/officeDocument/2006/relationships" xmlns:p="http://schemas.openxmlformats.org/presentationml/2006/main">
   <p:cSld>
     <p:spTree>
@@ -3441,7 +3388,7 @@
 </p:sld>
 </file>
 
-<file path=ppt/slides/slide13.xml><?xml version="1.0" encoding="utf-8"?>
+<file path=ppt/slides/slide12.xml><?xml version="1.0" encoding="utf-8"?>
 <p:sld xmlns:a="http://schemas.openxmlformats.org/drawingml/2006/main" xmlns:r="http://schemas.openxmlformats.org/officeDocument/2006/relationships" xmlns:p="http://schemas.openxmlformats.org/presentationml/2006/main">
   <p:cSld>
     <p:spTree>
@@ -3518,7 +3465,7 @@
 </p:sld>
 </file>
 
-<file path=ppt/slides/slide14.xml><?xml version="1.0" encoding="utf-8"?>
+<file path=ppt/slides/slide13.xml><?xml version="1.0" encoding="utf-8"?>
 <p:sld xmlns:a="http://schemas.openxmlformats.org/drawingml/2006/main" xmlns:r="http://schemas.openxmlformats.org/officeDocument/2006/relationships" xmlns:p="http://schemas.openxmlformats.org/presentationml/2006/main">
   <p:cSld>
     <p:spTree>
@@ -3570,7 +3517,7 @@
 </p:sld>
 </file>
 
-<file path=ppt/slides/slide15.xml><?xml version="1.0" encoding="utf-8"?>
+<file path=ppt/slides/slide14.xml><?xml version="1.0" encoding="utf-8"?>
 <p:sld xmlns:a="http://schemas.openxmlformats.org/drawingml/2006/main" xmlns:r="http://schemas.openxmlformats.org/officeDocument/2006/relationships" xmlns:p="http://schemas.openxmlformats.org/presentationml/2006/main">
   <p:cSld>
     <p:spTree>
@@ -3704,12 +3651,7 @@
             <p:ph type="title"/>
           </p:nvPr>
         </p:nvSpPr>
-        <p:spPr>
-          <a:xfrm>
-            <a:off x="722313" y="3305176"/>
-            <a:ext cx="7772400" cy="1021556"/>
-          </a:xfrm>
-        </p:spPr>
+        <p:spPr/>
         <p:txBody>
           <a:bodyPr/>
           <a:lstStyle/>
@@ -3719,7 +3661,32 @@
             </a:pPr>
             <a:r>
               <a:rPr/>
-              <a:t>Proving Pythagorean Theorem</a:t>
+              <a:t>The Pythagorean Theorem</a:t>
+            </a:r>
+          </a:p>
+        </p:txBody>
+      </p:sp>
+      <p:sp>
+        <p:nvSpPr>
+          <p:cNvPr id="3" name="Content Placeholder 2"/>
+          <p:cNvSpPr>
+            <a:spLocks noGrp="1"/>
+          </p:cNvSpPr>
+          <p:nvPr>
+            <p:ph idx="1"/>
+          </p:nvPr>
+        </p:nvSpPr>
+        <p:spPr/>
+        <p:txBody>
+          <a:bodyPr/>
+          <a:lstStyle/>
+          <a:p>
+            <a:pPr lvl="0" indent="0" marL="0">
+              <a:buNone/>
+            </a:pPr>
+            <a:r>
+              <a:rPr/>
+              <a:t>The Pythagorean Theorem is one of the earliest theorems known to ancient civilizations. This famous theorem is named after the Greek mathematician and philosopher, Pythagoras.</a:t>
             </a:r>
           </a:p>
         </p:txBody>
@@ -3766,7 +3733,7 @@
             </a:pPr>
             <a:r>
               <a:rPr/>
-              <a:t>The Pythagorean Theorem</a:t>
+              <a:t>THE PYTHAGOREAN THEOREM</a:t>
             </a:r>
           </a:p>
         </p:txBody>
@@ -3791,7 +3758,7 @@
             </a:pPr>
             <a:r>
               <a:rPr/>
-              <a:t>The Pythagorean Theorem is one of the earliest theorems known to ancient civilizations. This famous theorem is named after the Greek mathematician and philosopher, Pythagoras.</a:t>
+              <a:t>The Pythagorean Theorem is a statement about right triangles. The Pythagorean Theorem states that: “The area of the square built upon the hypotenuse of a right triangle is equal to the sum of the areas of the squares upon the remaining sides.”</a:t>
             </a:r>
           </a:p>
         </p:txBody>
@@ -3802,78 +3769,6 @@
 </file>
 
 <file path=ppt/slides/slide4.xml><?xml version="1.0" encoding="utf-8"?>
-<p:sld xmlns:a="http://schemas.openxmlformats.org/drawingml/2006/main" xmlns:r="http://schemas.openxmlformats.org/officeDocument/2006/relationships" xmlns:p="http://schemas.openxmlformats.org/presentationml/2006/main">
-  <p:cSld>
-    <p:spTree>
-      <p:nvGrpSpPr>
-        <p:cNvPr id="1" name=""/>
-        <p:cNvGrpSpPr/>
-        <p:nvPr/>
-      </p:nvGrpSpPr>
-      <p:grpSpPr>
-        <a:xfrm>
-          <a:off x="0" y="0"/>
-          <a:ext cx="0" cy="0"/>
-          <a:chOff x="0" y="0"/>
-          <a:chExt cx="0" cy="0"/>
-        </a:xfrm>
-      </p:grpSpPr>
-      <p:sp>
-        <p:nvSpPr>
-          <p:cNvPr id="2" name="Title 1"/>
-          <p:cNvSpPr>
-            <a:spLocks noGrp="1"/>
-          </p:cNvSpPr>
-          <p:nvPr>
-            <p:ph type="title"/>
-          </p:nvPr>
-        </p:nvSpPr>
-        <p:spPr/>
-        <p:txBody>
-          <a:bodyPr/>
-          <a:lstStyle/>
-          <a:p>
-            <a:pPr lvl="0" indent="0" marL="0">
-              <a:buNone/>
-            </a:pPr>
-            <a:r>
-              <a:rPr/>
-              <a:t>THE PYTHAGOREAN THEOREM</a:t>
-            </a:r>
-          </a:p>
-        </p:txBody>
-      </p:sp>
-      <p:sp>
-        <p:nvSpPr>
-          <p:cNvPr id="3" name="Content Placeholder 2"/>
-          <p:cNvSpPr>
-            <a:spLocks noGrp="1"/>
-          </p:cNvSpPr>
-          <p:nvPr>
-            <p:ph idx="1"/>
-          </p:nvPr>
-        </p:nvSpPr>
-        <p:spPr/>
-        <p:txBody>
-          <a:bodyPr/>
-          <a:lstStyle/>
-          <a:p>
-            <a:pPr lvl="0" indent="0" marL="0">
-              <a:buNone/>
-            </a:pPr>
-            <a:r>
-              <a:rPr/>
-              <a:t>The Pythagorean Theorem is a statement about right triangles. The Pythagorean Theorem states that: “The area of the square built upon the hypotenuse of a right triangle is equal to the sum of the areas of the squares upon the remaining sides.”</a:t>
-            </a:r>
-          </a:p>
-        </p:txBody>
-      </p:sp>
-    </p:spTree>
-  </p:cSld>
-</p:sld>
-</file>
-
-<file path=ppt/slides/slide5.xml><?xml version="1.0" encoding="utf-8"?>
 <p:sld xmlns:a="http://schemas.openxmlformats.org/drawingml/2006/main" xmlns:r="http://schemas.openxmlformats.org/officeDocument/2006/relationships" xmlns:p="http://schemas.openxmlformats.org/presentationml/2006/main">
   <p:cSld>
     <p:spTree>
@@ -3950,7 +3845,7 @@
 </p:sld>
 </file>
 
-<file path=ppt/slides/slide6.xml><?xml version="1.0" encoding="utf-8"?>
+<file path=ppt/slides/slide5.xml><?xml version="1.0" encoding="utf-8"?>
 <p:sld xmlns:a="http://schemas.openxmlformats.org/drawingml/2006/main" xmlns:r="http://schemas.openxmlformats.org/officeDocument/2006/relationships" xmlns:p="http://schemas.openxmlformats.org/presentationml/2006/main">
   <p:cSld>
     <p:spTree>
@@ -4002,7 +3897,7 @@
 </p:sld>
 </file>
 
-<file path=ppt/slides/slide7.xml><?xml version="1.0" encoding="utf-8"?>
+<file path=ppt/slides/slide6.xml><?xml version="1.0" encoding="utf-8"?>
 <p:sld xmlns:a="http://schemas.openxmlformats.org/drawingml/2006/main" xmlns:r="http://schemas.openxmlformats.org/officeDocument/2006/relationships" xmlns:p="http://schemas.openxmlformats.org/presentationml/2006/main">
   <p:cSld>
     <p:spTree>
@@ -4079,7 +3974,7 @@
 </p:sld>
 </file>
 
-<file path=ppt/slides/slide8.xml><?xml version="1.0" encoding="utf-8"?>
+<file path=ppt/slides/slide7.xml><?xml version="1.0" encoding="utf-8"?>
 <p:sld xmlns:a="http://schemas.openxmlformats.org/drawingml/2006/main" xmlns:r="http://schemas.openxmlformats.org/officeDocument/2006/relationships" xmlns:p="http://schemas.openxmlformats.org/presentationml/2006/main">
   <p:cSld>
     <p:spTree>
@@ -4139,6 +4034,58 @@
           <a:xfrm>
             <a:off x="2095500" y="1193800"/>
             <a:ext cx="4965700" cy="3390900"/>
+          </a:xfrm>
+          <a:prstGeom prst="rect">
+            <a:avLst/>
+          </a:prstGeom>
+          <a:noFill/>
+          <a:ln w="9525">
+            <a:noFill/>
+            <a:headEnd/>
+            <a:tailEnd/>
+          </a:ln>
+        </p:spPr>
+      </p:pic>
+    </p:spTree>
+  </p:cSld>
+</p:sld>
+</file>
+
+<file path=ppt/slides/slide8.xml><?xml version="1.0" encoding="utf-8"?>
+<p:sld xmlns:a="http://schemas.openxmlformats.org/drawingml/2006/main" xmlns:r="http://schemas.openxmlformats.org/officeDocument/2006/relationships" xmlns:p="http://schemas.openxmlformats.org/presentationml/2006/main">
+  <p:cSld>
+    <p:spTree>
+      <p:nvGrpSpPr>
+        <p:cNvPr id="1" name=""/>
+        <p:cNvGrpSpPr/>
+        <p:nvPr/>
+      </p:nvGrpSpPr>
+      <p:grpSpPr>
+        <a:xfrm>
+          <a:off x="0" y="0"/>
+          <a:ext cx="0" cy="0"/>
+          <a:chOff x="0" y="0"/>
+          <a:chExt cx="0" cy="0"/>
+        </a:xfrm>
+      </p:grpSpPr>
+      <p:pic>
+        <p:nvPicPr>
+          <p:cNvPr descr="Screenshot%202024-05-26%20221020.png" id="0" name="Picture 1"/>
+          <p:cNvPicPr>
+            <a:picLocks noGrp="1" noChangeAspect="1"/>
+          </p:cNvPicPr>
+          <p:nvPr/>
+        </p:nvPicPr>
+        <p:blipFill>
+          <a:blip r:embed="rId2"/>
+          <a:stretch>
+            <a:fillRect/>
+          </a:stretch>
+        </p:blipFill>
+        <p:spPr bwMode="auto">
+          <a:xfrm>
+            <a:off x="1333500" y="1193800"/>
+            <a:ext cx="6477000" cy="3390900"/>
           </a:xfrm>
           <a:prstGeom prst="rect">
             <a:avLst/>
@@ -4175,7 +4122,7 @@
       </p:grpSpPr>
       <p:pic>
         <p:nvPicPr>
-          <p:cNvPr descr="Screenshot%202024-05-26%20221020.png" id="0" name="Picture 1"/>
+          <p:cNvPr descr="Screenshot%202024-05-26%20221044.png" id="0" name="Picture 1"/>
           <p:cNvPicPr>
             <a:picLocks noGrp="1" noChangeAspect="1"/>
           </p:cNvPicPr>
@@ -4189,8 +4136,8 @@
         </p:blipFill>
         <p:spPr bwMode="auto">
           <a:xfrm>
-            <a:off x="1333500" y="1193800"/>
-            <a:ext cx="6477000" cy="3390900"/>
+            <a:off x="457200" y="1447800"/>
+            <a:ext cx="8229600" cy="2895600"/>
           </a:xfrm>
           <a:prstGeom prst="rect">
             <a:avLst/>

</xml_diff>